<commit_message>
Updates T2-VIR e T2-CC
</commit_message>
<xml_diff>
--- a/aulas/t/SOP-T2-CC.pptx
+++ b/aulas/t/SOP-T2-CC.pptx
@@ -5,10 +5,10 @@
     <p:sldMasterId id="2147483648" r:id="rId1"/>
   </p:sldMasterIdLst>
   <p:notesMasterIdLst>
-    <p:notesMasterId r:id="rId11"/>
+    <p:notesMasterId r:id="rId12"/>
   </p:notesMasterIdLst>
   <p:handoutMasterIdLst>
-    <p:handoutMasterId r:id="rId12"/>
+    <p:handoutMasterId r:id="rId13"/>
   </p:handoutMasterIdLst>
   <p:sldIdLst>
     <p:sldId id="256" r:id="rId2"/>
@@ -16,10 +16,11 @@
     <p:sldId id="379" r:id="rId4"/>
     <p:sldId id="394" r:id="rId5"/>
     <p:sldId id="399" r:id="rId6"/>
-    <p:sldId id="395" r:id="rId7"/>
-    <p:sldId id="397" r:id="rId8"/>
-    <p:sldId id="398" r:id="rId9"/>
-    <p:sldId id="378" r:id="rId10"/>
+    <p:sldId id="400" r:id="rId7"/>
+    <p:sldId id="395" r:id="rId8"/>
+    <p:sldId id="397" r:id="rId9"/>
+    <p:sldId id="398" r:id="rId10"/>
+    <p:sldId id="378" r:id="rId11"/>
   </p:sldIdLst>
   <p:sldSz cx="9144000" cy="5715000" type="screen16x10"/>
   <p:notesSz cx="7099300" cy="10234613"/>
@@ -947,6 +948,97 @@
 </p:notes>
 </file>
 
+<file path=ppt/notesSlides/notesSlide10.xml><?xml version="1.0" encoding="utf-8"?>
+<p:notes xmlns:a="http://schemas.openxmlformats.org/drawingml/2006/main" xmlns:r="http://schemas.openxmlformats.org/officeDocument/2006/relationships" xmlns:p="http://schemas.openxmlformats.org/presentationml/2006/main">
+  <p:cSld>
+    <p:spTree>
+      <p:nvGrpSpPr>
+        <p:cNvPr id="1" name=""/>
+        <p:cNvGrpSpPr/>
+        <p:nvPr/>
+      </p:nvGrpSpPr>
+      <p:grpSpPr>
+        <a:xfrm>
+          <a:off x="0" y="0"/>
+          <a:ext cx="0" cy="0"/>
+          <a:chOff x="0" y="0"/>
+          <a:chExt cx="0" cy="0"/>
+        </a:xfrm>
+      </p:grpSpPr>
+      <p:sp>
+        <p:nvSpPr>
+          <p:cNvPr id="7" name="Rectangle 7"/>
+          <p:cNvSpPr>
+            <a:spLocks noGrp="1" noChangeArrowheads="1"/>
+          </p:cNvSpPr>
+          <p:nvPr>
+            <p:ph type="sldNum" sz="quarter" idx="5"/>
+          </p:nvPr>
+        </p:nvSpPr>
+        <p:spPr>
+          <a:ln/>
+        </p:spPr>
+        <p:txBody>
+          <a:bodyPr/>
+          <a:lstStyle/>
+          <a:p>
+            <a:fld id="{FD2305D1-531D-4CEF-BD3D-05CF1AF8F416}" type="slidenum">
+              <a:rPr lang="en-GB"/>
+              <a:pPr/>
+              <a:t>10</a:t>
+            </a:fld>
+            <a:endParaRPr lang="en-GB" dirty="0"/>
+          </a:p>
+        </p:txBody>
+      </p:sp>
+      <p:sp>
+        <p:nvSpPr>
+          <p:cNvPr id="312322" name="Rectangle 2"/>
+          <p:cNvSpPr>
+            <a:spLocks noGrp="1" noRot="1" noChangeAspect="1" noChangeArrowheads="1" noTextEdit="1"/>
+          </p:cNvSpPr>
+          <p:nvPr>
+            <p:ph type="sldImg"/>
+          </p:nvPr>
+        </p:nvSpPr>
+        <p:spPr>
+          <a:xfrm>
+            <a:off x="477838" y="766763"/>
+            <a:ext cx="6145212" cy="3840162"/>
+          </a:xfrm>
+          <a:ln/>
+        </p:spPr>
+      </p:sp>
+      <p:sp>
+        <p:nvSpPr>
+          <p:cNvPr id="312323" name="Rectangle 3"/>
+          <p:cNvSpPr>
+            <a:spLocks noGrp="1" noChangeArrowheads="1"/>
+          </p:cNvSpPr>
+          <p:nvPr>
+            <p:ph type="body" idx="1"/>
+          </p:nvPr>
+        </p:nvSpPr>
+        <p:spPr/>
+        <p:txBody>
+          <a:bodyPr/>
+          <a:lstStyle/>
+          <a:p>
+            <a:r>
+              <a:rPr lang="en-GB" dirty="0"/>
+              <a:t>Ready for the demo</a:t>
+            </a:r>
+          </a:p>
+        </p:txBody>
+      </p:sp>
+    </p:spTree>
+  </p:cSld>
+  <p:clrMapOvr>
+    <a:masterClrMapping/>
+  </p:clrMapOvr>
+</p:notes>
+</file>
+
 <file path=ppt/notesSlides/notesSlide2.xml><?xml version="1.0" encoding="utf-8"?>
 <p:notes xmlns:a="http://schemas.openxmlformats.org/drawingml/2006/main" xmlns:r="http://schemas.openxmlformats.org/officeDocument/2006/relationships" xmlns:p="http://schemas.openxmlformats.org/presentationml/2006/main">
   <p:cSld>
@@ -1440,7 +1532,7 @@
     </p:spTree>
     <p:extLst>
       <p:ext uri="{BB962C8B-B14F-4D97-AF65-F5344CB8AC3E}">
-        <p14:creationId xmlns:p14="http://schemas.microsoft.com/office/powerpoint/2010/main" val="2197790958"/>
+        <p14:creationId xmlns:p14="http://schemas.microsoft.com/office/powerpoint/2010/main" val="3412478115"/>
       </p:ext>
     </p:extLst>
   </p:cSld>
@@ -1545,7 +1637,7 @@
     </p:spTree>
     <p:extLst>
       <p:ext uri="{BB962C8B-B14F-4D97-AF65-F5344CB8AC3E}">
-        <p14:creationId xmlns:p14="http://schemas.microsoft.com/office/powerpoint/2010/main" val="784052057"/>
+        <p14:creationId xmlns:p14="http://schemas.microsoft.com/office/powerpoint/2010/main" val="2197790958"/>
       </p:ext>
     </p:extLst>
   </p:cSld>
@@ -1650,7 +1742,7 @@
     </p:spTree>
     <p:extLst>
       <p:ext uri="{BB962C8B-B14F-4D97-AF65-F5344CB8AC3E}">
-        <p14:creationId xmlns:p14="http://schemas.microsoft.com/office/powerpoint/2010/main" val="4230454776"/>
+        <p14:creationId xmlns:p14="http://schemas.microsoft.com/office/powerpoint/2010/main" val="784052057"/>
       </p:ext>
     </p:extLst>
   </p:cSld>
@@ -1694,7 +1786,7 @@
           <a:bodyPr/>
           <a:lstStyle/>
           <a:p>
-            <a:fld id="{FD2305D1-531D-4CEF-BD3D-05CF1AF8F416}" type="slidenum">
+            <a:fld id="{8E79CF69-099A-4323-ABAD-2A1E82F62D20}" type="slidenum">
               <a:rPr lang="en-GB"/>
               <a:pPr/>
               <a:t>9</a:t>
@@ -1705,7 +1797,7 @@
       </p:sp>
       <p:sp>
         <p:nvSpPr>
-          <p:cNvPr id="312322" name="Rectangle 2"/>
+          <p:cNvPr id="149506" name="Rectangle 2"/>
           <p:cNvSpPr>
             <a:spLocks noGrp="1" noRot="1" noChangeAspect="1" noChangeArrowheads="1" noTextEdit="1"/>
           </p:cNvSpPr>
@@ -1723,7 +1815,7 @@
       </p:sp>
       <p:sp>
         <p:nvSpPr>
-          <p:cNvPr id="312323" name="Rectangle 3"/>
+          <p:cNvPr id="149507" name="Rectangle 3"/>
           <p:cNvSpPr>
             <a:spLocks noGrp="1" noChangeArrowheads="1"/>
           </p:cNvSpPr>
@@ -1737,13 +1829,27 @@
           <a:lstStyle/>
           <a:p>
             <a:r>
+              <a:rPr lang="en-GB" dirty="0" err="1"/>
+              <a:t>programa</a:t>
+            </a:r>
+            <a:r>
               <a:rPr lang="en-GB" dirty="0"/>
-              <a:t>Ready for the demo</a:t>
-            </a:r>
+              <a:t> Linux </a:t>
+            </a:r>
+            <a:r>
+              <a:rPr lang="en-GB" dirty="0" err="1"/>
+              <a:t>htop</a:t>
+            </a:r>
+            <a:endParaRPr lang="en-GB" dirty="0"/>
           </a:p>
         </p:txBody>
       </p:sp>
     </p:spTree>
+    <p:extLst>
+      <p:ext uri="{BB962C8B-B14F-4D97-AF65-F5344CB8AC3E}">
+        <p14:creationId xmlns:p14="http://schemas.microsoft.com/office/powerpoint/2010/main" val="4230454776"/>
+      </p:ext>
+    </p:extLst>
   </p:cSld>
   <p:clrMapOvr>
     <a:masterClrMapping/>
@@ -4940,6 +5046,485 @@
     </p:tnLst>
     <p:bldLst>
       <p:bldP spid="12" grpId="0"/>
+    </p:bldLst>
+  </p:timing>
+</p:sld>
+</file>
+
+<file path=ppt/slides/slide10.xml><?xml version="1.0" encoding="utf-8"?>
+<p:sld xmlns:a="http://schemas.openxmlformats.org/drawingml/2006/main" xmlns:r="http://schemas.openxmlformats.org/officeDocument/2006/relationships" xmlns:p="http://schemas.openxmlformats.org/presentationml/2006/main">
+  <p:cSld>
+    <p:spTree>
+      <p:nvGrpSpPr>
+        <p:cNvPr id="1" name=""/>
+        <p:cNvGrpSpPr/>
+        <p:nvPr/>
+      </p:nvGrpSpPr>
+      <p:grpSpPr>
+        <a:xfrm>
+          <a:off x="0" y="0"/>
+          <a:ext cx="0" cy="0"/>
+          <a:chOff x="0" y="0"/>
+          <a:chExt cx="0" cy="0"/>
+        </a:xfrm>
+      </p:grpSpPr>
+      <p:sp>
+        <p:nvSpPr>
+          <p:cNvPr id="311298" name="Rectangle 2"/>
+          <p:cNvSpPr>
+            <a:spLocks noGrp="1" noChangeArrowheads="1"/>
+          </p:cNvSpPr>
+          <p:nvPr>
+            <p:ph type="title" idx="4294967295"/>
+          </p:nvPr>
+        </p:nvSpPr>
+        <p:spPr bwMode="auto">
+          <a:xfrm>
+            <a:off x="3006330" y="193204"/>
+            <a:ext cx="5310086" cy="420688"/>
+          </a:xfrm>
+          <a:prstGeom prst="rect">
+            <a:avLst/>
+          </a:prstGeom>
+          <a:noFill/>
+          <a:ln>
+            <a:miter lim="800000"/>
+            <a:headEnd/>
+            <a:tailEnd/>
+          </a:ln>
+        </p:spPr>
+        <p:txBody>
+          <a:bodyPr vert="horz" wrap="square" lIns="71323" tIns="35662" rIns="71323" bIns="35662" numCol="1" anchor="t" anchorCtr="0" compatLnSpc="1">
+            <a:prstTxWarp prst="textNoShape">
+              <a:avLst/>
+            </a:prstTxWarp>
+          </a:bodyPr>
+          <a:lstStyle/>
+          <a:p>
+            <a:pPr algn="r"/>
+            <a:br>
+              <a:rPr lang="pt-PT" sz="1000" b="1" i="1" dirty="0">
+                <a:solidFill>
+                  <a:srgbClr val="FF0000"/>
+                </a:solidFill>
+                <a:latin typeface="Arial" charset="0"/>
+              </a:rPr>
+            </a:br>
+            <a:r>
+              <a:rPr lang="pt-PT" sz="1800" b="1" i="1" dirty="0">
+                <a:solidFill>
+                  <a:srgbClr val="FF0000"/>
+                </a:solidFill>
+                <a:latin typeface="Arial" charset="0"/>
+              </a:rPr>
+              <a:t>T</a:t>
+            </a:r>
+            <a:r>
+              <a:rPr lang="pt-PT" sz="1600" b="1" i="1" dirty="0">
+                <a:solidFill>
+                  <a:srgbClr val="FF0000"/>
+                </a:solidFill>
+                <a:latin typeface="Arial" charset="0"/>
+              </a:rPr>
+              <a:t>ESTE </a:t>
+            </a:r>
+            <a:r>
+              <a:rPr lang="pt-PT" sz="1800" b="1" i="1" dirty="0">
+                <a:solidFill>
+                  <a:srgbClr val="FF0000"/>
+                </a:solidFill>
+                <a:latin typeface="Arial" charset="0"/>
+              </a:rPr>
+              <a:t>T</a:t>
+            </a:r>
+            <a:r>
+              <a:rPr lang="pt-PT" sz="1600" b="1" i="1" dirty="0">
+                <a:solidFill>
+                  <a:srgbClr val="FF0000"/>
+                </a:solidFill>
+                <a:latin typeface="Arial" charset="0"/>
+              </a:rPr>
+              <a:t>EÓRICO </a:t>
+            </a:r>
+            <a:r>
+              <a:rPr lang="pt-PT" sz="1800" b="1" i="1" dirty="0">
+                <a:solidFill>
+                  <a:srgbClr val="FF0000"/>
+                </a:solidFill>
+                <a:latin typeface="Arial" charset="0"/>
+              </a:rPr>
+              <a:t>O</a:t>
+            </a:r>
+            <a:r>
+              <a:rPr lang="pt-PT" sz="1600" b="1" i="1" dirty="0">
+                <a:solidFill>
+                  <a:srgbClr val="FF0000"/>
+                </a:solidFill>
+                <a:latin typeface="Arial" charset="0"/>
+              </a:rPr>
+              <a:t>NLINE</a:t>
+            </a:r>
+            <a:endParaRPr lang="en-GB" sz="1600" b="1" i="1" dirty="0">
+              <a:solidFill>
+                <a:srgbClr val="FF0000"/>
+              </a:solidFill>
+              <a:latin typeface="Arial" charset="0"/>
+            </a:endParaRPr>
+          </a:p>
+        </p:txBody>
+      </p:sp>
+      <p:sp>
+        <p:nvSpPr>
+          <p:cNvPr id="5" name="Rectangle 3"/>
+          <p:cNvSpPr>
+            <a:spLocks noChangeArrowheads="1"/>
+          </p:cNvSpPr>
+          <p:nvPr/>
+        </p:nvSpPr>
+        <p:spPr bwMode="auto">
+          <a:xfrm>
+            <a:off x="540000" y="900000"/>
+            <a:ext cx="8064448" cy="3627070"/>
+          </a:xfrm>
+          <a:prstGeom prst="rect">
+            <a:avLst/>
+          </a:prstGeom>
+          <a:noFill/>
+          <a:ln w="9525">
+            <a:noFill/>
+            <a:miter lim="800000"/>
+            <a:headEnd/>
+            <a:tailEnd/>
+          </a:ln>
+          <a:effectLst/>
+        </p:spPr>
+        <p:txBody>
+          <a:bodyPr wrap="square" lIns="62408" tIns="31204" rIns="62408" bIns="31204">
+            <a:spAutoFit/>
+          </a:bodyPr>
+          <a:lstStyle/>
+          <a:p>
+            <a:pPr algn="l" defTabSz="704085">
+              <a:lnSpc>
+                <a:spcPct val="120000"/>
+              </a:lnSpc>
+            </a:pPr>
+            <a:r>
+              <a:rPr lang="pt-PT" sz="2000" b="0" i="0" dirty="0"/>
+              <a:t>Questionário online em:</a:t>
+            </a:r>
+          </a:p>
+          <a:p>
+            <a:pPr marL="357188" lvl="1" indent="-177800" algn="l" defTabSz="704085">
+              <a:lnSpc>
+                <a:spcPct val="120000"/>
+              </a:lnSpc>
+              <a:buFont typeface="Wingdings" pitchFamily="2" charset="2"/>
+              <a:buChar char="Ø"/>
+            </a:pPr>
+            <a:r>
+              <a:rPr lang="pt-PT" sz="2800" i="0" dirty="0"/>
+              <a:t>http://moodle.utad.pt/</a:t>
+            </a:r>
+            <a:endParaRPr lang="pt-PT" sz="2800" b="0" i="0" dirty="0"/>
+          </a:p>
+          <a:p>
+            <a:pPr marL="357188" lvl="1" indent="-177800" algn="l" defTabSz="704085">
+              <a:lnSpc>
+                <a:spcPct val="120000"/>
+              </a:lnSpc>
+              <a:buFont typeface="Wingdings" pitchFamily="2" charset="2"/>
+              <a:buChar char="Ø"/>
+            </a:pPr>
+            <a:r>
+              <a:rPr lang="pt-PT" sz="2800" b="0" i="0" dirty="0"/>
+              <a:t>UC: </a:t>
+            </a:r>
+            <a:r>
+              <a:rPr lang="pt-PT" sz="2800" i="0" dirty="0"/>
+              <a:t>Sistemas Operativos</a:t>
+            </a:r>
+          </a:p>
+          <a:p>
+            <a:pPr marL="357188" lvl="1" indent="-177800" algn="l" defTabSz="704085">
+              <a:lnSpc>
+                <a:spcPct val="120000"/>
+              </a:lnSpc>
+              <a:buFont typeface="Wingdings" pitchFamily="2" charset="2"/>
+              <a:buChar char="Ø"/>
+            </a:pPr>
+            <a:r>
+              <a:rPr lang="pt-PT" sz="2800" b="0" i="0" dirty="0"/>
+              <a:t>Password Geral: </a:t>
+            </a:r>
+            <a:r>
+              <a:rPr lang="pt-PT" sz="2800" i="0" dirty="0"/>
+              <a:t>so2223</a:t>
+            </a:r>
+          </a:p>
+          <a:p>
+            <a:pPr marL="357188" lvl="1" indent="-177800" algn="l" defTabSz="704085">
+              <a:lnSpc>
+                <a:spcPct val="120000"/>
+              </a:lnSpc>
+              <a:buFont typeface="Wingdings" pitchFamily="2" charset="2"/>
+              <a:buChar char="Ø"/>
+            </a:pPr>
+            <a:r>
+              <a:rPr lang="pt-PT" sz="2800" b="0" i="0" dirty="0">
+                <a:solidFill>
+                  <a:srgbClr val="FF0000"/>
+                </a:solidFill>
+              </a:rPr>
+              <a:t>Não conta para nota final.</a:t>
+            </a:r>
+            <a:endParaRPr lang="pt-PT" sz="2800" i="0" dirty="0"/>
+          </a:p>
+          <a:p>
+            <a:pPr marL="450850" lvl="1" indent="-271463" algn="l" defTabSz="704085">
+              <a:lnSpc>
+                <a:spcPct val="120000"/>
+              </a:lnSpc>
+              <a:buFont typeface="Wingdings" pitchFamily="2" charset="2"/>
+              <a:buChar char="Ø"/>
+            </a:pPr>
+            <a:r>
+              <a:rPr lang="pt-PT" sz="2000" i="0" dirty="0"/>
+              <a:t>1 conjunto de 3 questões (em 3 possíveis);</a:t>
+            </a:r>
+          </a:p>
+          <a:p>
+            <a:pPr marL="450850" lvl="1" indent="-271463" algn="l" defTabSz="704085">
+              <a:lnSpc>
+                <a:spcPct val="120000"/>
+              </a:lnSpc>
+              <a:buFont typeface="Wingdings" pitchFamily="2" charset="2"/>
+              <a:buChar char="Ø"/>
+            </a:pPr>
+            <a:r>
+              <a:rPr lang="en-GB" sz="2000" i="0" dirty="0"/>
+              <a:t>1 </a:t>
+            </a:r>
+            <a:r>
+              <a:rPr lang="en-GB" sz="2000" i="0" dirty="0" err="1"/>
+              <a:t>tentativa</a:t>
+            </a:r>
+            <a:r>
+              <a:rPr lang="en-GB" sz="2000" i="0" dirty="0"/>
+              <a:t> </a:t>
+            </a:r>
+            <a:r>
+              <a:rPr lang="en-GB" sz="2000" i="0" dirty="0" err="1"/>
+              <a:t>apenas</a:t>
+            </a:r>
+            <a:r>
+              <a:rPr lang="en-GB" sz="2000" i="0" dirty="0"/>
+              <a:t>, sempre </a:t>
+            </a:r>
+            <a:r>
+              <a:rPr lang="en-GB" sz="2000" i="0" dirty="0" err="1"/>
+              <a:t>aberto</a:t>
+            </a:r>
+            <a:r>
+              <a:rPr lang="en-GB" sz="2000" b="0" i="0" dirty="0"/>
+              <a:t>;</a:t>
+            </a:r>
+          </a:p>
+          <a:p>
+            <a:pPr marL="450850" lvl="1" indent="-271463" algn="l" defTabSz="704085">
+              <a:lnSpc>
+                <a:spcPct val="120000"/>
+              </a:lnSpc>
+              <a:buFont typeface="Wingdings" pitchFamily="2" charset="2"/>
+              <a:buChar char="Ø"/>
+            </a:pPr>
+            <a:r>
+              <a:rPr lang="en-GB" sz="2000" b="0" i="0" dirty="0" err="1"/>
+              <a:t>Duração</a:t>
+            </a:r>
+            <a:r>
+              <a:rPr lang="en-GB" sz="2000" b="0" i="0" dirty="0"/>
+              <a:t>: </a:t>
+            </a:r>
+            <a:r>
+              <a:rPr lang="en-GB" sz="2000" i="0" dirty="0"/>
+              <a:t>12 </a:t>
+            </a:r>
+            <a:r>
+              <a:rPr lang="en-GB" sz="2000" i="0" dirty="0" err="1"/>
+              <a:t>minutos</a:t>
+            </a:r>
+            <a:r>
+              <a:rPr lang="en-GB" sz="2000" b="0" i="0" dirty="0"/>
+              <a:t>.</a:t>
+            </a:r>
+          </a:p>
+        </p:txBody>
+      </p:sp>
+      <p:pic>
+        <p:nvPicPr>
+          <p:cNvPr id="6" name="Picture 4" descr="anim-opt"/>
+          <p:cNvPicPr>
+            <a:picLocks noChangeAspect="1" noChangeArrowheads="1" noCrop="1"/>
+          </p:cNvPicPr>
+          <p:nvPr/>
+        </p:nvPicPr>
+        <p:blipFill>
+          <a:blip r:embed="rId3" cstate="print"/>
+          <a:srcRect/>
+          <a:stretch>
+            <a:fillRect/>
+          </a:stretch>
+        </p:blipFill>
+        <p:spPr bwMode="auto">
+          <a:xfrm>
+            <a:off x="4734019" y="4777713"/>
+            <a:ext cx="4012406" cy="571500"/>
+          </a:xfrm>
+          <a:prstGeom prst="rect">
+            <a:avLst/>
+          </a:prstGeom>
+          <a:noFill/>
+        </p:spPr>
+      </p:pic>
+    </p:spTree>
+  </p:cSld>
+  <p:clrMapOvr>
+    <a:masterClrMapping/>
+  </p:clrMapOvr>
+  <p:timing>
+    <p:tnLst>
+      <p:par>
+        <p:cTn id="1" dur="indefinite" restart="never" nodeType="tmRoot">
+          <p:childTnLst>
+            <p:seq concurrent="1" nextAc="seek">
+              <p:cTn id="2" dur="indefinite" nodeType="mainSeq">
+                <p:childTnLst>
+                  <p:par>
+                    <p:cTn id="3" fill="hold">
+                      <p:stCondLst>
+                        <p:cond delay="indefinite"/>
+                        <p:cond evt="onBegin" delay="0">
+                          <p:tn val="2"/>
+                        </p:cond>
+                      </p:stCondLst>
+                      <p:childTnLst>
+                        <p:par>
+                          <p:cTn id="4" fill="hold">
+                            <p:stCondLst>
+                              <p:cond delay="0"/>
+                            </p:stCondLst>
+                            <p:childTnLst>
+                              <p:par>
+                                <p:cTn id="5" presetID="42" presetClass="entr" presetSubtype="0" fill="hold" grpId="0" nodeType="afterEffect">
+                                  <p:stCondLst>
+                                    <p:cond delay="0"/>
+                                  </p:stCondLst>
+                                  <p:childTnLst>
+                                    <p:set>
+                                      <p:cBhvr>
+                                        <p:cTn id="6" dur="1" fill="hold">
+                                          <p:stCondLst>
+                                            <p:cond delay="0"/>
+                                          </p:stCondLst>
+                                        </p:cTn>
+                                        <p:tgtEl>
+                                          <p:spTgt spid="5"/>
+                                        </p:tgtEl>
+                                        <p:attrNameLst>
+                                          <p:attrName>style.visibility</p:attrName>
+                                        </p:attrNameLst>
+                                      </p:cBhvr>
+                                      <p:to>
+                                        <p:strVal val="visible"/>
+                                      </p:to>
+                                    </p:set>
+                                    <p:animEffect transition="in" filter="fade">
+                                      <p:cBhvr>
+                                        <p:cTn id="7" dur="500"/>
+                                        <p:tgtEl>
+                                          <p:spTgt spid="5"/>
+                                        </p:tgtEl>
+                                      </p:cBhvr>
+                                    </p:animEffect>
+                                    <p:anim calcmode="lin" valueType="num">
+                                      <p:cBhvr>
+                                        <p:cTn id="8" dur="500" fill="hold"/>
+                                        <p:tgtEl>
+                                          <p:spTgt spid="5"/>
+                                        </p:tgtEl>
+                                        <p:attrNameLst>
+                                          <p:attrName>ppt_x</p:attrName>
+                                        </p:attrNameLst>
+                                      </p:cBhvr>
+                                      <p:tavLst>
+                                        <p:tav tm="0">
+                                          <p:val>
+                                            <p:strVal val="#ppt_x"/>
+                                          </p:val>
+                                        </p:tav>
+                                        <p:tav tm="100000">
+                                          <p:val>
+                                            <p:strVal val="#ppt_x"/>
+                                          </p:val>
+                                        </p:tav>
+                                      </p:tavLst>
+                                    </p:anim>
+                                    <p:anim calcmode="lin" valueType="num">
+                                      <p:cBhvr>
+                                        <p:cTn id="9" dur="500" fill="hold"/>
+                                        <p:tgtEl>
+                                          <p:spTgt spid="5"/>
+                                        </p:tgtEl>
+                                        <p:attrNameLst>
+                                          <p:attrName>ppt_y</p:attrName>
+                                        </p:attrNameLst>
+                                      </p:cBhvr>
+                                      <p:tavLst>
+                                        <p:tav tm="0">
+                                          <p:val>
+                                            <p:strVal val="#ppt_y+.1"/>
+                                          </p:val>
+                                        </p:tav>
+                                        <p:tav tm="100000">
+                                          <p:val>
+                                            <p:strVal val="#ppt_y"/>
+                                          </p:val>
+                                        </p:tav>
+                                      </p:tavLst>
+                                    </p:anim>
+                                  </p:childTnLst>
+                                </p:cTn>
+                              </p:par>
+                            </p:childTnLst>
+                          </p:cTn>
+                        </p:par>
+                      </p:childTnLst>
+                    </p:cTn>
+                  </p:par>
+                </p:childTnLst>
+              </p:cTn>
+              <p:prevCondLst>
+                <p:cond evt="onPrev" delay="0">
+                  <p:tgtEl>
+                    <p:sldTgt/>
+                  </p:tgtEl>
+                </p:cond>
+              </p:prevCondLst>
+              <p:nextCondLst>
+                <p:cond evt="onNext" delay="0">
+                  <p:tgtEl>
+                    <p:sldTgt/>
+                  </p:tgtEl>
+                </p:cond>
+              </p:nextCondLst>
+            </p:seq>
+          </p:childTnLst>
+        </p:cTn>
+      </p:par>
+    </p:tnLst>
+    <p:bldLst>
+      <p:bldP spid="5" grpId="0"/>
     </p:bldLst>
   </p:timing>
 </p:sld>
@@ -7166,22 +7751,17 @@
             </a:pPr>
             <a:r>
               <a:rPr lang="pt-PT" sz="667" b="0" dirty="0"/>
-              <a:t>Fonte: </a:t>
-            </a:r>
-            <a:r>
-              <a:rPr lang="pt-PT" sz="667" dirty="0"/>
-              <a:t>http://www.csoonline.com/article/2126885/cloud-security/saas--paas--and-iaas--a-security-checklist-for-cloud-models.html</a:t>
-            </a:r>
-            <a:endParaRPr lang="pt-PT" sz="667" b="0" dirty="0"/>
+              <a:t>Fonte:</a:t>
+            </a:r>
           </a:p>
         </p:txBody>
       </p:sp>
       <p:pic>
         <p:nvPicPr>
-          <p:cNvPr id="4" name="Picture 2">
+          <p:cNvPr id="1026" name="Picture 2">
             <a:extLst>
               <a:ext uri="{FF2B5EF4-FFF2-40B4-BE49-F238E27FC236}">
-                <a16:creationId xmlns:a16="http://schemas.microsoft.com/office/drawing/2014/main" id="{9FF1C189-4A3E-C2D3-10DE-BBBD844BC95B}"/>
+                <a16:creationId xmlns:a16="http://schemas.microsoft.com/office/drawing/2014/main" id="{692637D1-0E5D-992D-5384-377FE16066A4}"/>
               </a:ext>
             </a:extLst>
           </p:cNvPr>
@@ -7205,43 +7785,67 @@
         </p:blipFill>
         <p:spPr bwMode="auto">
           <a:xfrm>
-            <a:off x="1691680" y="1036970"/>
-            <a:ext cx="6102334" cy="3641059"/>
+            <a:off x="755576" y="913284"/>
+            <a:ext cx="3391520" cy="4192813"/>
           </a:xfrm>
           <a:prstGeom prst="rect">
             <a:avLst/>
           </a:prstGeom>
           <a:noFill/>
-          <a:ln>
-            <a:noFill/>
-          </a:ln>
-          <a:effectLst/>
           <a:extLst>
             <a:ext uri="{909E8E84-426E-40DD-AFC4-6F175D3DCCD1}">
               <a14:hiddenFill xmlns:a14="http://schemas.microsoft.com/office/drawing/2010/main">
                 <a:solidFill>
-                  <a:schemeClr val="accent1"/>
+                  <a:srgbClr val="FFFFFF"/>
                 </a:solidFill>
               </a14:hiddenFill>
             </a:ext>
-            <a:ext uri="{91240B29-F687-4F45-9708-019B960494DF}">
-              <a14:hiddenLine xmlns:a14="http://schemas.microsoft.com/office/drawing/2010/main" w="9525">
+          </a:extLst>
+        </p:spPr>
+      </p:pic>
+      <p:pic>
+        <p:nvPicPr>
+          <p:cNvPr id="1028" name="Picture 4">
+            <a:extLst>
+              <a:ext uri="{FF2B5EF4-FFF2-40B4-BE49-F238E27FC236}">
+                <a16:creationId xmlns:a16="http://schemas.microsoft.com/office/drawing/2014/main" id="{56B74A4A-9673-E924-7F4D-62F1C8824FEE}"/>
+              </a:ext>
+            </a:extLst>
+          </p:cNvPr>
+          <p:cNvPicPr>
+            <a:picLocks noChangeAspect="1" noChangeArrowheads="1"/>
+          </p:cNvPicPr>
+          <p:nvPr/>
+        </p:nvPicPr>
+        <p:blipFill>
+          <a:blip r:embed="rId4" cstate="print">
+            <a:extLst>
+              <a:ext uri="{28A0092B-C50C-407E-A947-70E740481C1C}">
+                <a14:useLocalDpi xmlns:a14="http://schemas.microsoft.com/office/drawing/2010/main" val="0"/>
+              </a:ext>
+            </a:extLst>
+          </a:blip>
+          <a:srcRect/>
+          <a:stretch>
+            <a:fillRect/>
+          </a:stretch>
+        </p:blipFill>
+        <p:spPr bwMode="auto">
+          <a:xfrm>
+            <a:off x="4133483" y="2065412"/>
+            <a:ext cx="5010517" cy="2964556"/>
+          </a:xfrm>
+          <a:prstGeom prst="rect">
+            <a:avLst/>
+          </a:prstGeom>
+          <a:noFill/>
+          <a:extLst>
+            <a:ext uri="{909E8E84-426E-40DD-AFC4-6F175D3DCCD1}">
+              <a14:hiddenFill xmlns:a14="http://schemas.microsoft.com/office/drawing/2010/main">
                 <a:solidFill>
-                  <a:schemeClr val="tx1"/>
+                  <a:srgbClr val="FFFFFF"/>
                 </a:solidFill>
-                <a:miter lim="800000"/>
-                <a:headEnd/>
-                <a:tailEnd/>
-              </a14:hiddenLine>
-            </a:ext>
-            <a:ext uri="{AF507438-7753-43E0-B8FC-AC1667EBCBE1}">
-              <a14:hiddenEffects xmlns:a14="http://schemas.microsoft.com/office/drawing/2010/main">
-                <a:effectLst>
-                  <a:outerShdw dist="35921" dir="2700000" algn="ctr" rotWithShape="0">
-                    <a:schemeClr val="bg2"/>
-                  </a:outerShdw>
-                </a:effectLst>
-              </a14:hiddenEffects>
+              </a14:hiddenFill>
             </a:ext>
           </a:extLst>
         </p:spPr>
@@ -7415,6 +8019,310 @@
                 </a:solidFill>
                 <a:latin typeface="Arial" charset="0"/>
               </a:rPr>
+              <a:t>Modelos</a:t>
+            </a:r>
+            <a:endParaRPr lang="pt-PT" sz="1600" b="1" i="1" cap="small" dirty="0">
+              <a:solidFill>
+                <a:srgbClr val="FF0000"/>
+              </a:solidFill>
+              <a:latin typeface="Arial" charset="0"/>
+            </a:endParaRPr>
+          </a:p>
+        </p:txBody>
+      </p:sp>
+      <p:sp>
+        <p:nvSpPr>
+          <p:cNvPr id="2" name="Text Box 19">
+            <a:extLst>
+              <a:ext uri="{FF2B5EF4-FFF2-40B4-BE49-F238E27FC236}">
+                <a16:creationId xmlns:a16="http://schemas.microsoft.com/office/drawing/2014/main" id="{FD03CE71-B2B5-6581-C487-6D28DA07CD22}"/>
+              </a:ext>
+            </a:extLst>
+          </p:cNvPr>
+          <p:cNvSpPr txBox="1">
+            <a:spLocks noChangeArrowheads="1"/>
+          </p:cNvSpPr>
+          <p:nvPr/>
+        </p:nvSpPr>
+        <p:spPr bwMode="auto">
+          <a:xfrm>
+            <a:off x="467544" y="5155165"/>
+            <a:ext cx="6900767" cy="162673"/>
+          </a:xfrm>
+          <a:prstGeom prst="rect">
+            <a:avLst/>
+          </a:prstGeom>
+          <a:noFill/>
+          <a:ln w="9525" algn="ctr">
+            <a:noFill/>
+            <a:miter lim="800000"/>
+            <a:headEnd/>
+            <a:tailEnd/>
+          </a:ln>
+          <a:effectLst/>
+        </p:spPr>
+        <p:txBody>
+          <a:bodyPr wrap="square" lIns="59436" tIns="29718" rIns="59436" bIns="29718">
+            <a:spAutoFit/>
+          </a:bodyPr>
+          <a:lstStyle/>
+          <a:p>
+            <a:pPr algn="l" eaLnBrk="1" hangingPunct="1">
+              <a:spcBef>
+                <a:spcPct val="50000"/>
+              </a:spcBef>
+            </a:pPr>
+            <a:r>
+              <a:rPr lang="pt-PT" sz="667" b="0" dirty="0"/>
+              <a:t>Fonte: </a:t>
+            </a:r>
+            <a:r>
+              <a:rPr lang="pt-PT" sz="667" dirty="0"/>
+              <a:t>http://www.csoonline.com/article/2126885/cloud-security/saas--paas--and-iaas--a-security-checklist-for-cloud-models.html</a:t>
+            </a:r>
+            <a:endParaRPr lang="pt-PT" sz="667" b="0" dirty="0"/>
+          </a:p>
+        </p:txBody>
+      </p:sp>
+      <p:pic>
+        <p:nvPicPr>
+          <p:cNvPr id="4" name="Picture 2">
+            <a:extLst>
+              <a:ext uri="{FF2B5EF4-FFF2-40B4-BE49-F238E27FC236}">
+                <a16:creationId xmlns:a16="http://schemas.microsoft.com/office/drawing/2014/main" id="{9FF1C189-4A3E-C2D3-10DE-BBBD844BC95B}"/>
+              </a:ext>
+            </a:extLst>
+          </p:cNvPr>
+          <p:cNvPicPr>
+            <a:picLocks noChangeAspect="1" noChangeArrowheads="1"/>
+          </p:cNvPicPr>
+          <p:nvPr/>
+        </p:nvPicPr>
+        <p:blipFill>
+          <a:blip r:embed="rId3">
+            <a:extLst>
+              <a:ext uri="{28A0092B-C50C-407E-A947-70E740481C1C}">
+                <a14:useLocalDpi xmlns:a14="http://schemas.microsoft.com/office/drawing/2010/main" val="0"/>
+              </a:ext>
+            </a:extLst>
+          </a:blip>
+          <a:srcRect/>
+          <a:stretch>
+            <a:fillRect/>
+          </a:stretch>
+        </p:blipFill>
+        <p:spPr bwMode="auto">
+          <a:xfrm>
+            <a:off x="1691680" y="1036970"/>
+            <a:ext cx="6102334" cy="3641059"/>
+          </a:xfrm>
+          <a:prstGeom prst="rect">
+            <a:avLst/>
+          </a:prstGeom>
+          <a:noFill/>
+          <a:ln>
+            <a:noFill/>
+          </a:ln>
+          <a:effectLst/>
+          <a:extLst>
+            <a:ext uri="{909E8E84-426E-40DD-AFC4-6F175D3DCCD1}">
+              <a14:hiddenFill xmlns:a14="http://schemas.microsoft.com/office/drawing/2010/main">
+                <a:solidFill>
+                  <a:schemeClr val="accent1"/>
+                </a:solidFill>
+              </a14:hiddenFill>
+            </a:ext>
+            <a:ext uri="{91240B29-F687-4F45-9708-019B960494DF}">
+              <a14:hiddenLine xmlns:a14="http://schemas.microsoft.com/office/drawing/2010/main" w="9525">
+                <a:solidFill>
+                  <a:schemeClr val="tx1"/>
+                </a:solidFill>
+                <a:miter lim="800000"/>
+                <a:headEnd/>
+                <a:tailEnd/>
+              </a14:hiddenLine>
+            </a:ext>
+            <a:ext uri="{AF507438-7753-43E0-B8FC-AC1667EBCBE1}">
+              <a14:hiddenEffects xmlns:a14="http://schemas.microsoft.com/office/drawing/2010/main">
+                <a:effectLst>
+                  <a:outerShdw dist="35921" dir="2700000" algn="ctr" rotWithShape="0">
+                    <a:schemeClr val="bg2"/>
+                  </a:outerShdw>
+                </a:effectLst>
+              </a14:hiddenEffects>
+            </a:ext>
+          </a:extLst>
+        </p:spPr>
+      </p:pic>
+    </p:spTree>
+    <p:extLst>
+      <p:ext uri="{BB962C8B-B14F-4D97-AF65-F5344CB8AC3E}">
+        <p14:creationId xmlns:p14="http://schemas.microsoft.com/office/powerpoint/2010/main" val="1476280934"/>
+      </p:ext>
+    </p:extLst>
+  </p:cSld>
+  <p:clrMapOvr>
+    <a:masterClrMapping/>
+  </p:clrMapOvr>
+  <p:timing>
+    <p:tnLst>
+      <p:par>
+        <p:cTn id="1" dur="indefinite" restart="never" nodeType="tmRoot">
+          <p:childTnLst>
+            <p:seq concurrent="1" nextAc="seek">
+              <p:cTn id="2" dur="indefinite" nodeType="mainSeq">
+                <p:childTnLst>
+                  <p:par>
+                    <p:cTn id="3" fill="hold">
+                      <p:stCondLst>
+                        <p:cond delay="indefinite"/>
+                        <p:cond evt="onBegin" delay="0">
+                          <p:tn val="2"/>
+                        </p:cond>
+                      </p:stCondLst>
+                      <p:childTnLst>
+                        <p:par>
+                          <p:cTn id="4" fill="hold">
+                            <p:stCondLst>
+                              <p:cond delay="0"/>
+                            </p:stCondLst>
+                            <p:childTnLst>
+                              <p:par>
+                                <p:cTn id="5" presetID="1" presetClass="entr" presetSubtype="0" fill="hold" grpId="0" nodeType="afterEffect">
+                                  <p:stCondLst>
+                                    <p:cond delay="0"/>
+                                  </p:stCondLst>
+                                  <p:childTnLst>
+                                    <p:set>
+                                      <p:cBhvr>
+                                        <p:cTn id="6" dur="1" fill="hold">
+                                          <p:stCondLst>
+                                            <p:cond delay="0"/>
+                                          </p:stCondLst>
+                                        </p:cTn>
+                                        <p:tgtEl>
+                                          <p:spTgt spid="2"/>
+                                        </p:tgtEl>
+                                        <p:attrNameLst>
+                                          <p:attrName>style.visibility</p:attrName>
+                                        </p:attrNameLst>
+                                      </p:cBhvr>
+                                      <p:to>
+                                        <p:strVal val="visible"/>
+                                      </p:to>
+                                    </p:set>
+                                  </p:childTnLst>
+                                </p:cTn>
+                              </p:par>
+                            </p:childTnLst>
+                          </p:cTn>
+                        </p:par>
+                      </p:childTnLst>
+                    </p:cTn>
+                  </p:par>
+                </p:childTnLst>
+              </p:cTn>
+              <p:prevCondLst>
+                <p:cond evt="onPrev" delay="0">
+                  <p:tgtEl>
+                    <p:sldTgt/>
+                  </p:tgtEl>
+                </p:cond>
+              </p:prevCondLst>
+              <p:nextCondLst>
+                <p:cond evt="onNext" delay="0">
+                  <p:tgtEl>
+                    <p:sldTgt/>
+                  </p:tgtEl>
+                </p:cond>
+              </p:nextCondLst>
+            </p:seq>
+          </p:childTnLst>
+        </p:cTn>
+      </p:par>
+    </p:tnLst>
+    <p:bldLst>
+      <p:bldP spid="2" grpId="0"/>
+    </p:bldLst>
+  </p:timing>
+</p:sld>
+</file>
+
+<file path=ppt/slides/slide7.xml><?xml version="1.0" encoding="utf-8"?>
+<p:sld xmlns:a="http://schemas.openxmlformats.org/drawingml/2006/main" xmlns:r="http://schemas.openxmlformats.org/officeDocument/2006/relationships" xmlns:p="http://schemas.openxmlformats.org/presentationml/2006/main">
+  <p:cSld>
+    <p:spTree>
+      <p:nvGrpSpPr>
+        <p:cNvPr id="1" name=""/>
+        <p:cNvGrpSpPr/>
+        <p:nvPr/>
+      </p:nvGrpSpPr>
+      <p:grpSpPr>
+        <a:xfrm>
+          <a:off x="0" y="0"/>
+          <a:ext cx="0" cy="0"/>
+          <a:chOff x="0" y="0"/>
+          <a:chExt cx="0" cy="0"/>
+        </a:xfrm>
+      </p:grpSpPr>
+      <p:sp>
+        <p:nvSpPr>
+          <p:cNvPr id="148482" name="Rectangle 2"/>
+          <p:cNvSpPr>
+            <a:spLocks noGrp="1" noChangeArrowheads="1"/>
+          </p:cNvSpPr>
+          <p:nvPr>
+            <p:ph type="title" idx="4294967295"/>
+          </p:nvPr>
+        </p:nvSpPr>
+        <p:spPr bwMode="auto">
+          <a:xfrm>
+            <a:off x="3006330" y="193204"/>
+            <a:ext cx="5310086" cy="432048"/>
+          </a:xfrm>
+          <a:prstGeom prst="rect">
+            <a:avLst/>
+          </a:prstGeom>
+          <a:noFill/>
+          <a:ln>
+            <a:miter lim="800000"/>
+            <a:headEnd/>
+            <a:tailEnd/>
+          </a:ln>
+        </p:spPr>
+        <p:txBody>
+          <a:bodyPr vert="horz" wrap="square" lIns="71323" tIns="35662" rIns="71323" bIns="35662" numCol="1" anchor="t" anchorCtr="0" compatLnSpc="1">
+            <a:prstTxWarp prst="textNoShape">
+              <a:avLst/>
+            </a:prstTxWarp>
+          </a:bodyPr>
+          <a:lstStyle/>
+          <a:p>
+            <a:pPr algn="r"/>
+            <a:r>
+              <a:rPr lang="pt-PT" sz="1000" b="1" i="1" dirty="0">
+                <a:solidFill>
+                  <a:srgbClr val="FF0000"/>
+                </a:solidFill>
+                <a:latin typeface="Arial" charset="0"/>
+              </a:rPr>
+              <a:t>SOP-T2-CC</a:t>
+            </a:r>
+            <a:br>
+              <a:rPr lang="pt-PT" sz="900" b="1" i="1" dirty="0">
+                <a:solidFill>
+                  <a:srgbClr val="FF0000"/>
+                </a:solidFill>
+                <a:latin typeface="Arial" charset="0"/>
+              </a:rPr>
+            </a:br>
+            <a:r>
+              <a:rPr lang="pt-PT" sz="1800" b="1" i="1" cap="small" dirty="0">
+                <a:solidFill>
+                  <a:srgbClr val="FF0000"/>
+                </a:solidFill>
+                <a:latin typeface="Arial" charset="0"/>
+              </a:rPr>
               <a:t>Organização</a:t>
             </a:r>
             <a:endParaRPr lang="pt-PT" sz="1600" b="1" i="1" cap="small" dirty="0">
@@ -7621,7 +8529,7 @@
 </p:sld>
 </file>
 
-<file path=ppt/slides/slide7.xml><?xml version="1.0" encoding="utf-8"?>
+<file path=ppt/slides/slide8.xml><?xml version="1.0" encoding="utf-8"?>
 <p:sld xmlns:a="http://schemas.openxmlformats.org/drawingml/2006/main" xmlns:r="http://schemas.openxmlformats.org/officeDocument/2006/relationships" xmlns:p="http://schemas.openxmlformats.org/presentationml/2006/main">
   <p:cSld>
     <p:spTree>
@@ -7902,7 +8810,7 @@
 </p:sld>
 </file>
 
-<file path=ppt/slides/slide8.xml><?xml version="1.0" encoding="utf-8"?>
+<file path=ppt/slides/slide9.xml><?xml version="1.0" encoding="utf-8"?>
 <p:sld xmlns:a="http://schemas.openxmlformats.org/drawingml/2006/main" xmlns:r="http://schemas.openxmlformats.org/officeDocument/2006/relationships" xmlns:p="http://schemas.openxmlformats.org/presentationml/2006/main">
   <p:cSld>
     <p:spTree>
@@ -8221,485 +9129,6 @@
     </p:tnLst>
     <p:bldLst>
       <p:bldP spid="2" grpId="0"/>
-    </p:bldLst>
-  </p:timing>
-</p:sld>
-</file>
-
-<file path=ppt/slides/slide9.xml><?xml version="1.0" encoding="utf-8"?>
-<p:sld xmlns:a="http://schemas.openxmlformats.org/drawingml/2006/main" xmlns:r="http://schemas.openxmlformats.org/officeDocument/2006/relationships" xmlns:p="http://schemas.openxmlformats.org/presentationml/2006/main">
-  <p:cSld>
-    <p:spTree>
-      <p:nvGrpSpPr>
-        <p:cNvPr id="1" name=""/>
-        <p:cNvGrpSpPr/>
-        <p:nvPr/>
-      </p:nvGrpSpPr>
-      <p:grpSpPr>
-        <a:xfrm>
-          <a:off x="0" y="0"/>
-          <a:ext cx="0" cy="0"/>
-          <a:chOff x="0" y="0"/>
-          <a:chExt cx="0" cy="0"/>
-        </a:xfrm>
-      </p:grpSpPr>
-      <p:sp>
-        <p:nvSpPr>
-          <p:cNvPr id="311298" name="Rectangle 2"/>
-          <p:cNvSpPr>
-            <a:spLocks noGrp="1" noChangeArrowheads="1"/>
-          </p:cNvSpPr>
-          <p:nvPr>
-            <p:ph type="title" idx="4294967295"/>
-          </p:nvPr>
-        </p:nvSpPr>
-        <p:spPr bwMode="auto">
-          <a:xfrm>
-            <a:off x="3006330" y="193204"/>
-            <a:ext cx="5310086" cy="420688"/>
-          </a:xfrm>
-          <a:prstGeom prst="rect">
-            <a:avLst/>
-          </a:prstGeom>
-          <a:noFill/>
-          <a:ln>
-            <a:miter lim="800000"/>
-            <a:headEnd/>
-            <a:tailEnd/>
-          </a:ln>
-        </p:spPr>
-        <p:txBody>
-          <a:bodyPr vert="horz" wrap="square" lIns="71323" tIns="35662" rIns="71323" bIns="35662" numCol="1" anchor="t" anchorCtr="0" compatLnSpc="1">
-            <a:prstTxWarp prst="textNoShape">
-              <a:avLst/>
-            </a:prstTxWarp>
-          </a:bodyPr>
-          <a:lstStyle/>
-          <a:p>
-            <a:pPr algn="r"/>
-            <a:br>
-              <a:rPr lang="pt-PT" sz="1000" b="1" i="1" dirty="0">
-                <a:solidFill>
-                  <a:srgbClr val="FF0000"/>
-                </a:solidFill>
-                <a:latin typeface="Arial" charset="0"/>
-              </a:rPr>
-            </a:br>
-            <a:r>
-              <a:rPr lang="pt-PT" sz="1800" b="1" i="1" dirty="0">
-                <a:solidFill>
-                  <a:srgbClr val="FF0000"/>
-                </a:solidFill>
-                <a:latin typeface="Arial" charset="0"/>
-              </a:rPr>
-              <a:t>T</a:t>
-            </a:r>
-            <a:r>
-              <a:rPr lang="pt-PT" sz="1600" b="1" i="1" dirty="0">
-                <a:solidFill>
-                  <a:srgbClr val="FF0000"/>
-                </a:solidFill>
-                <a:latin typeface="Arial" charset="0"/>
-              </a:rPr>
-              <a:t>ESTE </a:t>
-            </a:r>
-            <a:r>
-              <a:rPr lang="pt-PT" sz="1800" b="1" i="1" dirty="0">
-                <a:solidFill>
-                  <a:srgbClr val="FF0000"/>
-                </a:solidFill>
-                <a:latin typeface="Arial" charset="0"/>
-              </a:rPr>
-              <a:t>T</a:t>
-            </a:r>
-            <a:r>
-              <a:rPr lang="pt-PT" sz="1600" b="1" i="1" dirty="0">
-                <a:solidFill>
-                  <a:srgbClr val="FF0000"/>
-                </a:solidFill>
-                <a:latin typeface="Arial" charset="0"/>
-              </a:rPr>
-              <a:t>EÓRICO </a:t>
-            </a:r>
-            <a:r>
-              <a:rPr lang="pt-PT" sz="1800" b="1" i="1" dirty="0">
-                <a:solidFill>
-                  <a:srgbClr val="FF0000"/>
-                </a:solidFill>
-                <a:latin typeface="Arial" charset="0"/>
-              </a:rPr>
-              <a:t>O</a:t>
-            </a:r>
-            <a:r>
-              <a:rPr lang="pt-PT" sz="1600" b="1" i="1" dirty="0">
-                <a:solidFill>
-                  <a:srgbClr val="FF0000"/>
-                </a:solidFill>
-                <a:latin typeface="Arial" charset="0"/>
-              </a:rPr>
-              <a:t>NLINE</a:t>
-            </a:r>
-            <a:endParaRPr lang="en-GB" sz="1600" b="1" i="1" dirty="0">
-              <a:solidFill>
-                <a:srgbClr val="FF0000"/>
-              </a:solidFill>
-              <a:latin typeface="Arial" charset="0"/>
-            </a:endParaRPr>
-          </a:p>
-        </p:txBody>
-      </p:sp>
-      <p:sp>
-        <p:nvSpPr>
-          <p:cNvPr id="5" name="Rectangle 3"/>
-          <p:cNvSpPr>
-            <a:spLocks noChangeArrowheads="1"/>
-          </p:cNvSpPr>
-          <p:nvPr/>
-        </p:nvSpPr>
-        <p:spPr bwMode="auto">
-          <a:xfrm>
-            <a:off x="540000" y="900000"/>
-            <a:ext cx="8064448" cy="3627070"/>
-          </a:xfrm>
-          <a:prstGeom prst="rect">
-            <a:avLst/>
-          </a:prstGeom>
-          <a:noFill/>
-          <a:ln w="9525">
-            <a:noFill/>
-            <a:miter lim="800000"/>
-            <a:headEnd/>
-            <a:tailEnd/>
-          </a:ln>
-          <a:effectLst/>
-        </p:spPr>
-        <p:txBody>
-          <a:bodyPr wrap="square" lIns="62408" tIns="31204" rIns="62408" bIns="31204">
-            <a:spAutoFit/>
-          </a:bodyPr>
-          <a:lstStyle/>
-          <a:p>
-            <a:pPr algn="l" defTabSz="704085">
-              <a:lnSpc>
-                <a:spcPct val="120000"/>
-              </a:lnSpc>
-            </a:pPr>
-            <a:r>
-              <a:rPr lang="pt-PT" sz="2000" b="0" i="0" dirty="0"/>
-              <a:t>Questionário online em:</a:t>
-            </a:r>
-          </a:p>
-          <a:p>
-            <a:pPr marL="357188" lvl="1" indent="-177800" algn="l" defTabSz="704085">
-              <a:lnSpc>
-                <a:spcPct val="120000"/>
-              </a:lnSpc>
-              <a:buFont typeface="Wingdings" pitchFamily="2" charset="2"/>
-              <a:buChar char="Ø"/>
-            </a:pPr>
-            <a:r>
-              <a:rPr lang="pt-PT" sz="2800" i="0" dirty="0"/>
-              <a:t>http://moodle.utad.pt/</a:t>
-            </a:r>
-            <a:endParaRPr lang="pt-PT" sz="2800" b="0" i="0" dirty="0"/>
-          </a:p>
-          <a:p>
-            <a:pPr marL="357188" lvl="1" indent="-177800" algn="l" defTabSz="704085">
-              <a:lnSpc>
-                <a:spcPct val="120000"/>
-              </a:lnSpc>
-              <a:buFont typeface="Wingdings" pitchFamily="2" charset="2"/>
-              <a:buChar char="Ø"/>
-            </a:pPr>
-            <a:r>
-              <a:rPr lang="pt-PT" sz="2800" b="0" i="0" dirty="0"/>
-              <a:t>UC: </a:t>
-            </a:r>
-            <a:r>
-              <a:rPr lang="pt-PT" sz="2800" i="0" dirty="0"/>
-              <a:t>Sistemas Operativos</a:t>
-            </a:r>
-          </a:p>
-          <a:p>
-            <a:pPr marL="357188" lvl="1" indent="-177800" algn="l" defTabSz="704085">
-              <a:lnSpc>
-                <a:spcPct val="120000"/>
-              </a:lnSpc>
-              <a:buFont typeface="Wingdings" pitchFamily="2" charset="2"/>
-              <a:buChar char="Ø"/>
-            </a:pPr>
-            <a:r>
-              <a:rPr lang="pt-PT" sz="2800" b="0" i="0" dirty="0"/>
-              <a:t>Password Geral: </a:t>
-            </a:r>
-            <a:r>
-              <a:rPr lang="pt-PT" sz="2800" i="0" dirty="0"/>
-              <a:t>so2223</a:t>
-            </a:r>
-          </a:p>
-          <a:p>
-            <a:pPr marL="357188" lvl="1" indent="-177800" algn="l" defTabSz="704085">
-              <a:lnSpc>
-                <a:spcPct val="120000"/>
-              </a:lnSpc>
-              <a:buFont typeface="Wingdings" pitchFamily="2" charset="2"/>
-              <a:buChar char="Ø"/>
-            </a:pPr>
-            <a:r>
-              <a:rPr lang="pt-PT" sz="2800" b="0" i="0" dirty="0">
-                <a:solidFill>
-                  <a:srgbClr val="FF0000"/>
-                </a:solidFill>
-              </a:rPr>
-              <a:t>Não conta para nota final.</a:t>
-            </a:r>
-            <a:endParaRPr lang="pt-PT" sz="2800" i="0" dirty="0"/>
-          </a:p>
-          <a:p>
-            <a:pPr marL="450850" lvl="1" indent="-271463" algn="l" defTabSz="704085">
-              <a:lnSpc>
-                <a:spcPct val="120000"/>
-              </a:lnSpc>
-              <a:buFont typeface="Wingdings" pitchFamily="2" charset="2"/>
-              <a:buChar char="Ø"/>
-            </a:pPr>
-            <a:r>
-              <a:rPr lang="pt-PT" sz="2000" i="0" dirty="0"/>
-              <a:t>1 conjunto de 3 questões (em 3 possíveis);</a:t>
-            </a:r>
-          </a:p>
-          <a:p>
-            <a:pPr marL="450850" lvl="1" indent="-271463" algn="l" defTabSz="704085">
-              <a:lnSpc>
-                <a:spcPct val="120000"/>
-              </a:lnSpc>
-              <a:buFont typeface="Wingdings" pitchFamily="2" charset="2"/>
-              <a:buChar char="Ø"/>
-            </a:pPr>
-            <a:r>
-              <a:rPr lang="en-GB" sz="2000" i="0" dirty="0"/>
-              <a:t>1 </a:t>
-            </a:r>
-            <a:r>
-              <a:rPr lang="en-GB" sz="2000" i="0" dirty="0" err="1"/>
-              <a:t>tentativa</a:t>
-            </a:r>
-            <a:r>
-              <a:rPr lang="en-GB" sz="2000" i="0" dirty="0"/>
-              <a:t> </a:t>
-            </a:r>
-            <a:r>
-              <a:rPr lang="en-GB" sz="2000" i="0" dirty="0" err="1"/>
-              <a:t>apenas</a:t>
-            </a:r>
-            <a:r>
-              <a:rPr lang="en-GB" sz="2000" i="0" dirty="0"/>
-              <a:t>, sempre </a:t>
-            </a:r>
-            <a:r>
-              <a:rPr lang="en-GB" sz="2000" i="0" dirty="0" err="1"/>
-              <a:t>aberto</a:t>
-            </a:r>
-            <a:r>
-              <a:rPr lang="en-GB" sz="2000" b="0" i="0" dirty="0"/>
-              <a:t>;</a:t>
-            </a:r>
-          </a:p>
-          <a:p>
-            <a:pPr marL="450850" lvl="1" indent="-271463" algn="l" defTabSz="704085">
-              <a:lnSpc>
-                <a:spcPct val="120000"/>
-              </a:lnSpc>
-              <a:buFont typeface="Wingdings" pitchFamily="2" charset="2"/>
-              <a:buChar char="Ø"/>
-            </a:pPr>
-            <a:r>
-              <a:rPr lang="en-GB" sz="2000" b="0" i="0" dirty="0" err="1"/>
-              <a:t>Duração</a:t>
-            </a:r>
-            <a:r>
-              <a:rPr lang="en-GB" sz="2000" b="0" i="0" dirty="0"/>
-              <a:t>: </a:t>
-            </a:r>
-            <a:r>
-              <a:rPr lang="en-GB" sz="2000" i="0" dirty="0"/>
-              <a:t>12 </a:t>
-            </a:r>
-            <a:r>
-              <a:rPr lang="en-GB" sz="2000" i="0" dirty="0" err="1"/>
-              <a:t>minutos</a:t>
-            </a:r>
-            <a:r>
-              <a:rPr lang="en-GB" sz="2000" b="0" i="0" dirty="0"/>
-              <a:t>.</a:t>
-            </a:r>
-          </a:p>
-        </p:txBody>
-      </p:sp>
-      <p:pic>
-        <p:nvPicPr>
-          <p:cNvPr id="6" name="Picture 4" descr="anim-opt"/>
-          <p:cNvPicPr>
-            <a:picLocks noChangeAspect="1" noChangeArrowheads="1" noCrop="1"/>
-          </p:cNvPicPr>
-          <p:nvPr/>
-        </p:nvPicPr>
-        <p:blipFill>
-          <a:blip r:embed="rId3" cstate="print"/>
-          <a:srcRect/>
-          <a:stretch>
-            <a:fillRect/>
-          </a:stretch>
-        </p:blipFill>
-        <p:spPr bwMode="auto">
-          <a:xfrm>
-            <a:off x="4734019" y="4777713"/>
-            <a:ext cx="4012406" cy="571500"/>
-          </a:xfrm>
-          <a:prstGeom prst="rect">
-            <a:avLst/>
-          </a:prstGeom>
-          <a:noFill/>
-        </p:spPr>
-      </p:pic>
-    </p:spTree>
-  </p:cSld>
-  <p:clrMapOvr>
-    <a:masterClrMapping/>
-  </p:clrMapOvr>
-  <p:timing>
-    <p:tnLst>
-      <p:par>
-        <p:cTn id="1" dur="indefinite" restart="never" nodeType="tmRoot">
-          <p:childTnLst>
-            <p:seq concurrent="1" nextAc="seek">
-              <p:cTn id="2" dur="indefinite" nodeType="mainSeq">
-                <p:childTnLst>
-                  <p:par>
-                    <p:cTn id="3" fill="hold">
-                      <p:stCondLst>
-                        <p:cond delay="indefinite"/>
-                        <p:cond evt="onBegin" delay="0">
-                          <p:tn val="2"/>
-                        </p:cond>
-                      </p:stCondLst>
-                      <p:childTnLst>
-                        <p:par>
-                          <p:cTn id="4" fill="hold">
-                            <p:stCondLst>
-                              <p:cond delay="0"/>
-                            </p:stCondLst>
-                            <p:childTnLst>
-                              <p:par>
-                                <p:cTn id="5" presetID="42" presetClass="entr" presetSubtype="0" fill="hold" grpId="0" nodeType="afterEffect">
-                                  <p:stCondLst>
-                                    <p:cond delay="0"/>
-                                  </p:stCondLst>
-                                  <p:childTnLst>
-                                    <p:set>
-                                      <p:cBhvr>
-                                        <p:cTn id="6" dur="1" fill="hold">
-                                          <p:stCondLst>
-                                            <p:cond delay="0"/>
-                                          </p:stCondLst>
-                                        </p:cTn>
-                                        <p:tgtEl>
-                                          <p:spTgt spid="5"/>
-                                        </p:tgtEl>
-                                        <p:attrNameLst>
-                                          <p:attrName>style.visibility</p:attrName>
-                                        </p:attrNameLst>
-                                      </p:cBhvr>
-                                      <p:to>
-                                        <p:strVal val="visible"/>
-                                      </p:to>
-                                    </p:set>
-                                    <p:animEffect transition="in" filter="fade">
-                                      <p:cBhvr>
-                                        <p:cTn id="7" dur="500"/>
-                                        <p:tgtEl>
-                                          <p:spTgt spid="5"/>
-                                        </p:tgtEl>
-                                      </p:cBhvr>
-                                    </p:animEffect>
-                                    <p:anim calcmode="lin" valueType="num">
-                                      <p:cBhvr>
-                                        <p:cTn id="8" dur="500" fill="hold"/>
-                                        <p:tgtEl>
-                                          <p:spTgt spid="5"/>
-                                        </p:tgtEl>
-                                        <p:attrNameLst>
-                                          <p:attrName>ppt_x</p:attrName>
-                                        </p:attrNameLst>
-                                      </p:cBhvr>
-                                      <p:tavLst>
-                                        <p:tav tm="0">
-                                          <p:val>
-                                            <p:strVal val="#ppt_x"/>
-                                          </p:val>
-                                        </p:tav>
-                                        <p:tav tm="100000">
-                                          <p:val>
-                                            <p:strVal val="#ppt_x"/>
-                                          </p:val>
-                                        </p:tav>
-                                      </p:tavLst>
-                                    </p:anim>
-                                    <p:anim calcmode="lin" valueType="num">
-                                      <p:cBhvr>
-                                        <p:cTn id="9" dur="500" fill="hold"/>
-                                        <p:tgtEl>
-                                          <p:spTgt spid="5"/>
-                                        </p:tgtEl>
-                                        <p:attrNameLst>
-                                          <p:attrName>ppt_y</p:attrName>
-                                        </p:attrNameLst>
-                                      </p:cBhvr>
-                                      <p:tavLst>
-                                        <p:tav tm="0">
-                                          <p:val>
-                                            <p:strVal val="#ppt_y+.1"/>
-                                          </p:val>
-                                        </p:tav>
-                                        <p:tav tm="100000">
-                                          <p:val>
-                                            <p:strVal val="#ppt_y"/>
-                                          </p:val>
-                                        </p:tav>
-                                      </p:tavLst>
-                                    </p:anim>
-                                  </p:childTnLst>
-                                </p:cTn>
-                              </p:par>
-                            </p:childTnLst>
-                          </p:cTn>
-                        </p:par>
-                      </p:childTnLst>
-                    </p:cTn>
-                  </p:par>
-                </p:childTnLst>
-              </p:cTn>
-              <p:prevCondLst>
-                <p:cond evt="onPrev" delay="0">
-                  <p:tgtEl>
-                    <p:sldTgt/>
-                  </p:tgtEl>
-                </p:cond>
-              </p:prevCondLst>
-              <p:nextCondLst>
-                <p:cond evt="onNext" delay="0">
-                  <p:tgtEl>
-                    <p:sldTgt/>
-                  </p:tgtEl>
-                </p:cond>
-              </p:nextCondLst>
-            </p:seq>
-          </p:childTnLst>
-        </p:cTn>
-      </p:par>
-    </p:tnLst>
-    <p:bldLst>
-      <p:bldP spid="5" grpId="0"/>
     </p:bldLst>
   </p:timing>
 </p:sld>

</xml_diff>